<commit_message>
Checked AutoRun and Template
</commit_message>
<xml_diff>
--- a/Assets/StreamingAssets/2D_Objects/ConfigTemplate/~Template Instructions.pptx
+++ b/Assets/StreamingAssets/2D_Objects/ConfigTemplate/~Template Instructions.pptx
@@ -265,7 +265,7 @@
           <a:p>
             <a:fld id="{43D9F887-C526-42E2-BE1C-7F1C55940A26}" type="datetimeFigureOut">
               <a:rPr lang="en-US" smtClean="0"/>
-              <a:t>7/22/2020</a:t>
+              <a:t>7/27/2020</a:t>
             </a:fld>
             <a:endParaRPr lang="en-US"/>
           </a:p>
@@ -463,7 +463,7 @@
           <a:p>
             <a:fld id="{43D9F887-C526-42E2-BE1C-7F1C55940A26}" type="datetimeFigureOut">
               <a:rPr lang="en-US" smtClean="0"/>
-              <a:t>7/22/2020</a:t>
+              <a:t>7/27/2020</a:t>
             </a:fld>
             <a:endParaRPr lang="en-US"/>
           </a:p>
@@ -671,7 +671,7 @@
           <a:p>
             <a:fld id="{43D9F887-C526-42E2-BE1C-7F1C55940A26}" type="datetimeFigureOut">
               <a:rPr lang="en-US" smtClean="0"/>
-              <a:t>7/22/2020</a:t>
+              <a:t>7/27/2020</a:t>
             </a:fld>
             <a:endParaRPr lang="en-US"/>
           </a:p>
@@ -869,7 +869,7 @@
           <a:p>
             <a:fld id="{43D9F887-C526-42E2-BE1C-7F1C55940A26}" type="datetimeFigureOut">
               <a:rPr lang="en-US" smtClean="0"/>
-              <a:t>7/22/2020</a:t>
+              <a:t>7/27/2020</a:t>
             </a:fld>
             <a:endParaRPr lang="en-US"/>
           </a:p>
@@ -1144,7 +1144,7 @@
           <a:p>
             <a:fld id="{43D9F887-C526-42E2-BE1C-7F1C55940A26}" type="datetimeFigureOut">
               <a:rPr lang="en-US" smtClean="0"/>
-              <a:t>7/22/2020</a:t>
+              <a:t>7/27/2020</a:t>
             </a:fld>
             <a:endParaRPr lang="en-US"/>
           </a:p>
@@ -1409,7 +1409,7 @@
           <a:p>
             <a:fld id="{43D9F887-C526-42E2-BE1C-7F1C55940A26}" type="datetimeFigureOut">
               <a:rPr lang="en-US" smtClean="0"/>
-              <a:t>7/22/2020</a:t>
+              <a:t>7/27/2020</a:t>
             </a:fld>
             <a:endParaRPr lang="en-US"/>
           </a:p>
@@ -1821,7 +1821,7 @@
           <a:p>
             <a:fld id="{43D9F887-C526-42E2-BE1C-7F1C55940A26}" type="datetimeFigureOut">
               <a:rPr lang="en-US" smtClean="0"/>
-              <a:t>7/22/2020</a:t>
+              <a:t>7/27/2020</a:t>
             </a:fld>
             <a:endParaRPr lang="en-US"/>
           </a:p>
@@ -1962,7 +1962,7 @@
           <a:p>
             <a:fld id="{43D9F887-C526-42E2-BE1C-7F1C55940A26}" type="datetimeFigureOut">
               <a:rPr lang="en-US" smtClean="0"/>
-              <a:t>7/22/2020</a:t>
+              <a:t>7/27/2020</a:t>
             </a:fld>
             <a:endParaRPr lang="en-US"/>
           </a:p>
@@ -2075,7 +2075,7 @@
           <a:p>
             <a:fld id="{43D9F887-C526-42E2-BE1C-7F1C55940A26}" type="datetimeFigureOut">
               <a:rPr lang="en-US" smtClean="0"/>
-              <a:t>7/22/2020</a:t>
+              <a:t>7/27/2020</a:t>
             </a:fld>
             <a:endParaRPr lang="en-US"/>
           </a:p>
@@ -2386,7 +2386,7 @@
           <a:p>
             <a:fld id="{43D9F887-C526-42E2-BE1C-7F1C55940A26}" type="datetimeFigureOut">
               <a:rPr lang="en-US" smtClean="0"/>
-              <a:t>7/22/2020</a:t>
+              <a:t>7/27/2020</a:t>
             </a:fld>
             <a:endParaRPr lang="en-US"/>
           </a:p>
@@ -2674,7 +2674,7 @@
           <a:p>
             <a:fld id="{43D9F887-C526-42E2-BE1C-7F1C55940A26}" type="datetimeFigureOut">
               <a:rPr lang="en-US" smtClean="0"/>
-              <a:t>7/22/2020</a:t>
+              <a:t>7/27/2020</a:t>
             </a:fld>
             <a:endParaRPr lang="en-US"/>
           </a:p>
@@ -2915,7 +2915,7 @@
           <a:p>
             <a:fld id="{43D9F887-C526-42E2-BE1C-7F1C55940A26}" type="datetimeFigureOut">
               <a:rPr lang="en-US" smtClean="0"/>
-              <a:t>7/22/2020</a:t>
+              <a:t>7/27/2020</a:t>
             </a:fld>
             <a:endParaRPr lang="en-US"/>
           </a:p>
@@ -3530,17 +3530,17 @@
           <a:p>
             <a:r>
               <a:rPr lang="en-US" b="1" dirty="0"/>
-              <a:t>Collect</a:t>
+              <a:t>Find</a:t>
             </a:r>
           </a:p>
         </p:txBody>
       </p:sp>
       <p:pic>
         <p:nvPicPr>
-          <p:cNvPr id="5" name="Picture 4" descr="A red apple&#10;&#10;Description automatically generated">
-            <a:extLst>
-              <a:ext uri="{FF2B5EF4-FFF2-40B4-BE49-F238E27FC236}">
-                <a16:creationId xmlns:a16="http://schemas.microsoft.com/office/drawing/2014/main" id="{5222F148-B9D0-47FF-A5E3-802700705EC4}"/>
+          <p:cNvPr id="4" name="Graphic 3">
+            <a:extLst>
+              <a:ext uri="{FF2B5EF4-FFF2-40B4-BE49-F238E27FC236}">
+                <a16:creationId xmlns:a16="http://schemas.microsoft.com/office/drawing/2014/main" id="{6EBD55A4-00D9-4F3B-A5A4-5EB55EFC4AFD}"/>
               </a:ext>
             </a:extLst>
           </p:cNvPr>
@@ -3552,8 +3552,8 @@
         <p:blipFill>
           <a:blip r:embed="rId2">
             <a:extLst>
-              <a:ext uri="{28A0092B-C50C-407E-A947-70E740481C1C}">
-                <a14:useLocalDpi xmlns:a14="http://schemas.microsoft.com/office/drawing/2010/main" val="0"/>
+              <a:ext uri="{96DAC541-7B7A-43D3-8B79-37D633B846F1}">
+                <asvg:svgBlip xmlns:asvg="http://schemas.microsoft.com/office/drawing/2016/SVG/main" r:embed="rId3"/>
               </a:ext>
             </a:extLst>
           </a:blip>
@@ -3563,43 +3563,7 @@
         </p:blipFill>
         <p:spPr>
           <a:xfrm>
-            <a:off x="2643990" y="2669921"/>
-            <a:ext cx="2857500" cy="2857500"/>
-          </a:xfrm>
-          <a:prstGeom prst="rect">
-            <a:avLst/>
-          </a:prstGeom>
-        </p:spPr>
-      </p:pic>
-      <p:pic>
-        <p:nvPicPr>
-          <p:cNvPr id="4" name="Graphic 3">
-            <a:extLst>
-              <a:ext uri="{FF2B5EF4-FFF2-40B4-BE49-F238E27FC236}">
-                <a16:creationId xmlns:a16="http://schemas.microsoft.com/office/drawing/2014/main" id="{6EBD55A4-00D9-4F3B-A5A4-5EB55EFC4AFD}"/>
-              </a:ext>
-            </a:extLst>
-          </p:cNvPr>
-          <p:cNvPicPr>
-            <a:picLocks noChangeAspect="1"/>
-          </p:cNvPicPr>
-          <p:nvPr/>
-        </p:nvPicPr>
-        <p:blipFill>
-          <a:blip r:embed="rId3">
-            <a:extLst>
-              <a:ext uri="{96DAC541-7B7A-43D3-8B79-37D633B846F1}">
-                <asvg:svgBlip xmlns:asvg="http://schemas.microsoft.com/office/drawing/2016/SVG/main" r:embed="rId4"/>
-              </a:ext>
-            </a:extLst>
-          </a:blip>
-          <a:stretch>
-            <a:fillRect/>
-          </a:stretch>
-        </p:blipFill>
-        <p:spPr>
-          <a:xfrm>
-            <a:off x="7085013" y="2977029"/>
+            <a:off x="4835108" y="2800566"/>
             <a:ext cx="2688907" cy="2664628"/>
           </a:xfrm>
           <a:prstGeom prst="rect">

</xml_diff>

<commit_message>
Added configuration file and function for testing contingency
</commit_message>
<xml_diff>
--- a/Assets/StreamingAssets/2D_Objects/ConfigTemplate/~Template Instructions.pptx
+++ b/Assets/StreamingAssets/2D_Objects/ConfigTemplate/~Template Instructions.pptx
@@ -12,6 +12,8 @@
     <p:sldId id="262" r:id="rId6"/>
     <p:sldId id="286" r:id="rId7"/>
     <p:sldId id="287" r:id="rId8"/>
+    <p:sldId id="288" r:id="rId9"/>
+    <p:sldId id="289" r:id="rId10"/>
   </p:sldIdLst>
   <p:sldSz cx="12192000" cy="6858000"/>
   <p:notesSz cx="6858000" cy="9144000"/>
@@ -265,7 +267,7 @@
           <a:p>
             <a:fld id="{43D9F887-C526-42E2-BE1C-7F1C55940A26}" type="datetimeFigureOut">
               <a:rPr lang="en-US" smtClean="0"/>
-              <a:t>7/27/2020</a:t>
+              <a:t>8/22/2020</a:t>
             </a:fld>
             <a:endParaRPr lang="en-US"/>
           </a:p>
@@ -463,7 +465,7 @@
           <a:p>
             <a:fld id="{43D9F887-C526-42E2-BE1C-7F1C55940A26}" type="datetimeFigureOut">
               <a:rPr lang="en-US" smtClean="0"/>
-              <a:t>7/27/2020</a:t>
+              <a:t>8/22/2020</a:t>
             </a:fld>
             <a:endParaRPr lang="en-US"/>
           </a:p>
@@ -671,7 +673,7 @@
           <a:p>
             <a:fld id="{43D9F887-C526-42E2-BE1C-7F1C55940A26}" type="datetimeFigureOut">
               <a:rPr lang="en-US" smtClean="0"/>
-              <a:t>7/27/2020</a:t>
+              <a:t>8/22/2020</a:t>
             </a:fld>
             <a:endParaRPr lang="en-US"/>
           </a:p>
@@ -869,7 +871,7 @@
           <a:p>
             <a:fld id="{43D9F887-C526-42E2-BE1C-7F1C55940A26}" type="datetimeFigureOut">
               <a:rPr lang="en-US" smtClean="0"/>
-              <a:t>7/27/2020</a:t>
+              <a:t>8/22/2020</a:t>
             </a:fld>
             <a:endParaRPr lang="en-US"/>
           </a:p>
@@ -1144,7 +1146,7 @@
           <a:p>
             <a:fld id="{43D9F887-C526-42E2-BE1C-7F1C55940A26}" type="datetimeFigureOut">
               <a:rPr lang="en-US" smtClean="0"/>
-              <a:t>7/27/2020</a:t>
+              <a:t>8/22/2020</a:t>
             </a:fld>
             <a:endParaRPr lang="en-US"/>
           </a:p>
@@ -1409,7 +1411,7 @@
           <a:p>
             <a:fld id="{43D9F887-C526-42E2-BE1C-7F1C55940A26}" type="datetimeFigureOut">
               <a:rPr lang="en-US" smtClean="0"/>
-              <a:t>7/27/2020</a:t>
+              <a:t>8/22/2020</a:t>
             </a:fld>
             <a:endParaRPr lang="en-US"/>
           </a:p>
@@ -1821,7 +1823,7 @@
           <a:p>
             <a:fld id="{43D9F887-C526-42E2-BE1C-7F1C55940A26}" type="datetimeFigureOut">
               <a:rPr lang="en-US" smtClean="0"/>
-              <a:t>7/27/2020</a:t>
+              <a:t>8/22/2020</a:t>
             </a:fld>
             <a:endParaRPr lang="en-US"/>
           </a:p>
@@ -1962,7 +1964,7 @@
           <a:p>
             <a:fld id="{43D9F887-C526-42E2-BE1C-7F1C55940A26}" type="datetimeFigureOut">
               <a:rPr lang="en-US" smtClean="0"/>
-              <a:t>7/27/2020</a:t>
+              <a:t>8/22/2020</a:t>
             </a:fld>
             <a:endParaRPr lang="en-US"/>
           </a:p>
@@ -2075,7 +2077,7 @@
           <a:p>
             <a:fld id="{43D9F887-C526-42E2-BE1C-7F1C55940A26}" type="datetimeFigureOut">
               <a:rPr lang="en-US" smtClean="0"/>
-              <a:t>7/27/2020</a:t>
+              <a:t>8/22/2020</a:t>
             </a:fld>
             <a:endParaRPr lang="en-US"/>
           </a:p>
@@ -2386,7 +2388,7 @@
           <a:p>
             <a:fld id="{43D9F887-C526-42E2-BE1C-7F1C55940A26}" type="datetimeFigureOut">
               <a:rPr lang="en-US" smtClean="0"/>
-              <a:t>7/27/2020</a:t>
+              <a:t>8/22/2020</a:t>
             </a:fld>
             <a:endParaRPr lang="en-US"/>
           </a:p>
@@ -2674,7 +2676,7 @@
           <a:p>
             <a:fld id="{43D9F887-C526-42E2-BE1C-7F1C55940A26}" type="datetimeFigureOut">
               <a:rPr lang="en-US" smtClean="0"/>
-              <a:t>7/27/2020</a:t>
+              <a:t>8/22/2020</a:t>
             </a:fld>
             <a:endParaRPr lang="en-US"/>
           </a:p>
@@ -2915,7 +2917,7 @@
           <a:p>
             <a:fld id="{43D9F887-C526-42E2-BE1C-7F1C55940A26}" type="datetimeFigureOut">
               <a:rPr lang="en-US" smtClean="0"/>
-              <a:t>7/27/2020</a:t>
+              <a:t>8/22/2020</a:t>
             </a:fld>
             <a:endParaRPr lang="en-US"/>
           </a:p>
@@ -4807,6 +4809,140 @@
 </p:sld>
 </file>
 
+<file path=ppt/slides/slide8.xml><?xml version="1.0" encoding="utf-8"?>
+<p:sld xmlns:a="http://schemas.openxmlformats.org/drawingml/2006/main" xmlns:r="http://schemas.openxmlformats.org/officeDocument/2006/relationships" xmlns:p="http://schemas.openxmlformats.org/presentationml/2006/main">
+  <p:cSld>
+    <p:spTree>
+      <p:nvGrpSpPr>
+        <p:cNvPr id="1" name=""/>
+        <p:cNvGrpSpPr/>
+        <p:nvPr/>
+      </p:nvGrpSpPr>
+      <p:grpSpPr>
+        <a:xfrm>
+          <a:off x="0" y="0"/>
+          <a:ext cx="0" cy="0"/>
+          <a:chOff x="0" y="0"/>
+          <a:chExt cx="0" cy="0"/>
+        </a:xfrm>
+      </p:grpSpPr>
+      <p:sp>
+        <p:nvSpPr>
+          <p:cNvPr id="2" name="Title 1">
+            <a:extLst>
+              <a:ext uri="{FF2B5EF4-FFF2-40B4-BE49-F238E27FC236}">
+                <a16:creationId xmlns:a16="http://schemas.microsoft.com/office/drawing/2014/main" id="{66564375-A227-41E2-813E-42AF6400AD27}"/>
+              </a:ext>
+            </a:extLst>
+          </p:cNvPr>
+          <p:cNvSpPr>
+            <a:spLocks noGrp="1"/>
+          </p:cNvSpPr>
+          <p:nvPr>
+            <p:ph type="title"/>
+          </p:nvPr>
+        </p:nvSpPr>
+        <p:spPr>
+          <a:xfrm>
+            <a:off x="838200" y="2831488"/>
+            <a:ext cx="10515600" cy="1325563"/>
+          </a:xfrm>
+        </p:spPr>
+        <p:txBody>
+          <a:bodyPr>
+            <a:normAutofit fontScale="90000"/>
+          </a:bodyPr>
+          <a:lstStyle/>
+          <a:p>
+            <a:pPr algn="ctr"/>
+            <a:r>
+              <a:rPr lang="en-US" sz="9800" b="1" dirty="0"/>
+              <a:t>FAIL!!</a:t>
+            </a:r>
+            <a:endParaRPr lang="en-US" b="1" dirty="0"/>
+          </a:p>
+        </p:txBody>
+      </p:sp>
+    </p:spTree>
+    <p:extLst>
+      <p:ext uri="{BB962C8B-B14F-4D97-AF65-F5344CB8AC3E}">
+        <p14:creationId xmlns:p14="http://schemas.microsoft.com/office/powerpoint/2010/main" val="3142393107"/>
+      </p:ext>
+    </p:extLst>
+  </p:cSld>
+  <p:clrMapOvr>
+    <a:masterClrMapping/>
+  </p:clrMapOvr>
+</p:sld>
+</file>
+
+<file path=ppt/slides/slide9.xml><?xml version="1.0" encoding="utf-8"?>
+<p:sld xmlns:a="http://schemas.openxmlformats.org/drawingml/2006/main" xmlns:r="http://schemas.openxmlformats.org/officeDocument/2006/relationships" xmlns:p="http://schemas.openxmlformats.org/presentationml/2006/main">
+  <p:cSld>
+    <p:spTree>
+      <p:nvGrpSpPr>
+        <p:cNvPr id="1" name=""/>
+        <p:cNvGrpSpPr/>
+        <p:nvPr/>
+      </p:nvGrpSpPr>
+      <p:grpSpPr>
+        <a:xfrm>
+          <a:off x="0" y="0"/>
+          <a:ext cx="0" cy="0"/>
+          <a:chOff x="0" y="0"/>
+          <a:chExt cx="0" cy="0"/>
+        </a:xfrm>
+      </p:grpSpPr>
+      <p:sp>
+        <p:nvSpPr>
+          <p:cNvPr id="2" name="Title 1">
+            <a:extLst>
+              <a:ext uri="{FF2B5EF4-FFF2-40B4-BE49-F238E27FC236}">
+                <a16:creationId xmlns:a16="http://schemas.microsoft.com/office/drawing/2014/main" id="{66564375-A227-41E2-813E-42AF6400AD27}"/>
+              </a:ext>
+            </a:extLst>
+          </p:cNvPr>
+          <p:cNvSpPr>
+            <a:spLocks noGrp="1"/>
+          </p:cNvSpPr>
+          <p:nvPr>
+            <p:ph type="title"/>
+          </p:nvPr>
+        </p:nvSpPr>
+        <p:spPr>
+          <a:xfrm>
+            <a:off x="838200" y="2831488"/>
+            <a:ext cx="10515600" cy="1325563"/>
+          </a:xfrm>
+        </p:spPr>
+        <p:txBody>
+          <a:bodyPr>
+            <a:normAutofit fontScale="90000"/>
+          </a:bodyPr>
+          <a:lstStyle/>
+          <a:p>
+            <a:pPr algn="ctr"/>
+            <a:r>
+              <a:rPr lang="en-US" sz="9800" b="1" dirty="0"/>
+              <a:t>PASS!!</a:t>
+            </a:r>
+            <a:endParaRPr lang="en-US" b="1" dirty="0"/>
+          </a:p>
+        </p:txBody>
+      </p:sp>
+    </p:spTree>
+    <p:extLst>
+      <p:ext uri="{BB962C8B-B14F-4D97-AF65-F5344CB8AC3E}">
+        <p14:creationId xmlns:p14="http://schemas.microsoft.com/office/powerpoint/2010/main" val="3563481256"/>
+      </p:ext>
+    </p:extLst>
+  </p:cSld>
+  <p:clrMapOvr>
+    <a:masterClrMapping/>
+  </p:clrMapOvr>
+</p:sld>
+</file>
+
 <file path=ppt/theme/theme1.xml><?xml version="1.0" encoding="utf-8"?>
 <a:theme xmlns:a="http://schemas.openxmlformats.org/drawingml/2006/main" name="Office Theme">
   <a:themeElements>

</xml_diff>